<commit_message>
Presentation, Project Part 3
Updated PDF and PowerPoint
</commit_message>
<xml_diff>
--- a/CSCI4448_ProjectPart3/TypeSpeedGame_Part3.pptx
+++ b/CSCI4448_ProjectPart3/TypeSpeedGame_Part3.pptx
@@ -228,7 +228,7 @@
           <a:p>
             <a:fld id="{FE5B4EDC-59C0-49C7-8ADA-5A781B329E02}" type="datetimeFigureOut">
               <a:rPr lang="en-US"/>
-              <a:t>12/5/2015</a:t>
+              <a:t>12/6/2015</a:t>
             </a:fld>
             <a:endParaRPr/>
           </a:p>
@@ -393,7 +393,7 @@
           <a:p>
             <a:fld id="{F2D8D46A-B586-417D-BFBD-8C8FE0AAF762}" type="datetimeFigureOut">
               <a:rPr lang="en-US"/>
-              <a:t>12/5/2015</a:t>
+              <a:t>12/6/2015</a:t>
             </a:fld>
             <a:endParaRPr/>
           </a:p>
@@ -1416,7 +1416,7 @@
           <a:p>
             <a:fld id="{F0DFD029-FB74-4578-B929-F66AA97659CA}" type="datetimeFigureOut">
               <a:rPr lang="en-US"/>
-              <a:t>12/5/2015</a:t>
+              <a:t>12/6/2015</a:t>
             </a:fld>
             <a:endParaRPr/>
           </a:p>
@@ -1621,7 +1621,7 @@
           <a:p>
             <a:fld id="{F0DFD029-FB74-4578-B929-F66AA97659CA}" type="datetimeFigureOut">
               <a:rPr lang="en-US"/>
-              <a:t>12/5/2015</a:t>
+              <a:t>12/6/2015</a:t>
             </a:fld>
             <a:endParaRPr/>
           </a:p>
@@ -1836,7 +1836,7 @@
           <a:p>
             <a:fld id="{F0DFD029-FB74-4578-B929-F66AA97659CA}" type="datetimeFigureOut">
               <a:rPr lang="en-US"/>
-              <a:t>12/5/2015</a:t>
+              <a:t>12/6/2015</a:t>
             </a:fld>
             <a:endParaRPr/>
           </a:p>
@@ -2041,7 +2041,7 @@
           <a:p>
             <a:fld id="{F0DFD029-FB74-4578-B929-F66AA97659CA}" type="datetimeFigureOut">
               <a:rPr lang="en-US"/>
-              <a:t>12/5/2015</a:t>
+              <a:t>12/6/2015</a:t>
             </a:fld>
             <a:endParaRPr/>
           </a:p>
@@ -2311,7 +2311,7 @@
           <a:p>
             <a:fld id="{F0DFD029-FB74-4578-B929-F66AA97659CA}" type="datetimeFigureOut">
               <a:rPr lang="en-US"/>
-              <a:t>12/5/2015</a:t>
+              <a:t>12/6/2015</a:t>
             </a:fld>
             <a:endParaRPr/>
           </a:p>
@@ -2791,7 +2791,7 @@
           <a:p>
             <a:fld id="{F0DFD029-FB74-4578-B929-F66AA97659CA}" type="datetimeFigureOut">
               <a:rPr lang="en-US"/>
-              <a:t>12/5/2015</a:t>
+              <a:t>12/6/2015</a:t>
             </a:fld>
             <a:endParaRPr/>
           </a:p>
@@ -3254,7 +3254,7 @@
           <a:p>
             <a:fld id="{F0DFD029-FB74-4578-B929-F66AA97659CA}" type="datetimeFigureOut">
               <a:rPr lang="en-US"/>
-              <a:t>12/5/2015</a:t>
+              <a:t>12/6/2015</a:t>
             </a:fld>
             <a:endParaRPr/>
           </a:p>
@@ -3391,7 +3391,7 @@
           <a:p>
             <a:fld id="{F0DFD029-FB74-4578-B929-F66AA97659CA}" type="datetimeFigureOut">
               <a:rPr lang="en-US"/>
-              <a:t>12/5/2015</a:t>
+              <a:t>12/6/2015</a:t>
             </a:fld>
             <a:endParaRPr/>
           </a:p>
@@ -3505,7 +3505,7 @@
           <a:p>
             <a:fld id="{F0DFD029-FB74-4578-B929-F66AA97659CA}" type="datetimeFigureOut">
               <a:rPr lang="en-US"/>
-              <a:t>12/5/2015</a:t>
+              <a:t>12/6/2015</a:t>
             </a:fld>
             <a:endParaRPr/>
           </a:p>
@@ -3811,7 +3811,7 @@
           <a:p>
             <a:fld id="{F0DFD029-FB74-4578-B929-F66AA97659CA}" type="datetimeFigureOut">
               <a:rPr lang="en-US"/>
-              <a:t>12/5/2015</a:t>
+              <a:t>12/6/2015</a:t>
             </a:fld>
             <a:endParaRPr/>
           </a:p>
@@ -4106,7 +4106,7 @@
           <a:p>
             <a:fld id="{F0DFD029-FB74-4578-B929-F66AA97659CA}" type="datetimeFigureOut">
               <a:rPr lang="en-US"/>
-              <a:t>12/5/2015</a:t>
+              <a:t>12/6/2015</a:t>
             </a:fld>
             <a:endParaRPr/>
           </a:p>
@@ -4736,7 +4736,7 @@
             <a:fld id="{F0DFD029-FB74-4578-B929-F66AA97659CA}" type="datetimeFigureOut">
               <a:rPr lang="en-US"/>
               <a:pPr/>
-              <a:t>12/5/2015</a:t>
+              <a:t>12/6/2015</a:t>
             </a:fld>
             <a:endParaRPr/>
           </a:p>
@@ -5381,7 +5381,7 @@
       </p:sp>
       <p:pic>
         <p:nvPicPr>
-          <p:cNvPr id="6" name="VideoDemo"/>
+          <p:cNvPr id="2" name="VideoDemo"/>
           <p:cNvPicPr>
             <a:picLocks noRot="1" noChangeAspect="1"/>
           </p:cNvPicPr>
@@ -5397,8 +5397,8 @@
         </p:blipFill>
         <p:spPr>
           <a:xfrm>
-            <a:off x="1218883" y="1397954"/>
-            <a:ext cx="10209529" cy="5256846"/>
+            <a:off x="2893774" y="1481667"/>
+            <a:ext cx="7010717" cy="5258038"/>
           </a:xfrm>
           <a:prstGeom prst="rect">
             <a:avLst/>
@@ -5460,7 +5460,7 @@
                                       <p:cBhvr>
                                         <p:cTn id="6" dur="1" fill="hold"/>
                                         <p:tgtEl>
-                                          <p:spTgt spid="6"/>
+                                          <p:spTgt spid="2"/>
                                         </p:tgtEl>
                                       </p:cBhvr>
                                     </p:cmd>
@@ -5492,13 +5492,13 @@
             </p:seq>
             <p:video>
               <p:cMediaNode>
-                <p:cTn id="7" fill="hold" display="0">
+                <p:cTn id="7" fill="remove" display="0">
                   <p:stCondLst>
                     <p:cond delay="indefinite"/>
                   </p:stCondLst>
                 </p:cTn>
                 <p:tgtEl>
-                  <p:spTgt spid="6"/>
+                  <p:spTgt spid="2"/>
                 </p:tgtEl>
               </p:cMediaNode>
             </p:video>
@@ -5507,7 +5507,7 @@
                 <p:stCondLst>
                   <p:cond evt="onClick" delay="0">
                     <p:tgtEl>
-                      <p:spTgt spid="6"/>
+                      <p:spTgt spid="2"/>
                     </p:tgtEl>
                   </p:cond>
                 </p:stCondLst>
@@ -5537,7 +5537,7 @@
                                       <p:cBhvr>
                                         <p:cTn id="12" dur="1" fill="hold"/>
                                         <p:tgtEl>
-                                          <p:spTgt spid="6"/>
+                                          <p:spTgt spid="2"/>
                                         </p:tgtEl>
                                       </p:cBhvr>
                                     </p:cmd>
@@ -5555,7 +5555,7 @@
               <p:nextCondLst>
                 <p:cond evt="onClick" delay="0">
                   <p:tgtEl>
-                    <p:spTgt spid="6"/>
+                    <p:spTgt spid="2"/>
                   </p:tgtEl>
                 </p:cond>
               </p:nextCondLst>
@@ -5812,7 +5812,12 @@
             <p:ph type="body" idx="1"/>
           </p:nvPr>
         </p:nvSpPr>
-        <p:spPr/>
+        <p:spPr>
+          <a:xfrm>
+            <a:off x="859272" y="1701800"/>
+            <a:ext cx="5082740" cy="914400"/>
+          </a:xfrm>
+        </p:spPr>
         <p:txBody>
           <a:bodyPr/>
           <a:lstStyle/>
@@ -5837,7 +5842,7 @@
         </p:nvSpPr>
         <p:spPr>
           <a:xfrm>
-            <a:off x="1218883" y="2717800"/>
+            <a:off x="859272" y="2717800"/>
             <a:ext cx="4037329" cy="3454400"/>
           </a:xfrm>
         </p:spPr>
@@ -5897,8 +5902,8 @@
         </p:blipFill>
         <p:spPr>
           <a:xfrm>
-            <a:off x="5484812" y="2165496"/>
-            <a:ext cx="6303776" cy="3701904"/>
+            <a:off x="5254624" y="1498600"/>
+            <a:ext cx="6723840" cy="4978400"/>
           </a:xfrm>
           <a:prstGeom prst="rect">
             <a:avLst/>

</xml_diff>